<commit_message>
Added results pictures to presentation
</commit_message>
<xml_diff>
--- a/Group7.pptx
+++ b/Group7.pptx
@@ -12,8 +12,9 @@
     <p:sldId id="262" r:id="rId6"/>
     <p:sldId id="263" r:id="rId7"/>
     <p:sldId id="264" r:id="rId8"/>
-    <p:sldId id="265" r:id="rId9"/>
-    <p:sldId id="266" r:id="rId10"/>
+    <p:sldId id="267" r:id="rId9"/>
+    <p:sldId id="265" r:id="rId10"/>
+    <p:sldId id="266" r:id="rId11"/>
   </p:sldIdLst>
   <p:sldSz cx="12192000" cy="6858000"/>
   <p:notesSz cx="6858000" cy="9144000"/>
@@ -303,7 +304,7 @@
           <a:p>
             <a:fld id="{1413064E-06D1-CA46-8C36-21FA595EAC52}" type="datetimeFigureOut">
               <a:rPr lang="en-US" smtClean="0"/>
-              <a:t>4/6/19</a:t>
+              <a:t>4/8/2019</a:t>
             </a:fld>
             <a:endParaRPr lang="en-US"/>
           </a:p>
@@ -578,7 +579,7 @@
           <a:p>
             <a:fld id="{1413064E-06D1-CA46-8C36-21FA595EAC52}" type="datetimeFigureOut">
               <a:rPr lang="en-US" smtClean="0"/>
-              <a:t>4/6/19</a:t>
+              <a:t>4/8/2019</a:t>
             </a:fld>
             <a:endParaRPr lang="en-US"/>
           </a:p>
@@ -772,7 +773,7 @@
           <a:p>
             <a:fld id="{1413064E-06D1-CA46-8C36-21FA595EAC52}" type="datetimeFigureOut">
               <a:rPr lang="en-US" smtClean="0"/>
-              <a:t>4/6/19</a:t>
+              <a:t>4/8/2019</a:t>
             </a:fld>
             <a:endParaRPr lang="en-US"/>
           </a:p>
@@ -1040,7 +1041,7 @@
           <a:p>
             <a:fld id="{1413064E-06D1-CA46-8C36-21FA595EAC52}" type="datetimeFigureOut">
               <a:rPr lang="en-US" smtClean="0"/>
-              <a:t>4/6/19</a:t>
+              <a:t>4/8/2019</a:t>
             </a:fld>
             <a:endParaRPr lang="en-US"/>
           </a:p>
@@ -1372,7 +1373,7 @@
           <a:p>
             <a:fld id="{1413064E-06D1-CA46-8C36-21FA595EAC52}" type="datetimeFigureOut">
               <a:rPr lang="en-US" smtClean="0"/>
-              <a:t>4/6/19</a:t>
+              <a:t>4/8/2019</a:t>
             </a:fld>
             <a:endParaRPr lang="en-US"/>
           </a:p>
@@ -1982,7 +1983,7 @@
           <a:p>
             <a:fld id="{1413064E-06D1-CA46-8C36-21FA595EAC52}" type="datetimeFigureOut">
               <a:rPr lang="en-US" smtClean="0"/>
-              <a:t>4/6/19</a:t>
+              <a:t>4/8/2019</a:t>
             </a:fld>
             <a:endParaRPr lang="en-US"/>
           </a:p>
@@ -2829,7 +2830,7 @@
           <a:p>
             <a:fld id="{1413064E-06D1-CA46-8C36-21FA595EAC52}" type="datetimeFigureOut">
               <a:rPr lang="en-US" smtClean="0"/>
-              <a:t>4/6/19</a:t>
+              <a:t>4/8/2019</a:t>
             </a:fld>
             <a:endParaRPr lang="en-US"/>
           </a:p>
@@ -2999,7 +3000,7 @@
           <a:p>
             <a:fld id="{1413064E-06D1-CA46-8C36-21FA595EAC52}" type="datetimeFigureOut">
               <a:rPr lang="en-US" smtClean="0"/>
-              <a:t>4/6/19</a:t>
+              <a:t>4/8/2019</a:t>
             </a:fld>
             <a:endParaRPr lang="en-US"/>
           </a:p>
@@ -3179,7 +3180,7 @@
           <a:p>
             <a:fld id="{1413064E-06D1-CA46-8C36-21FA595EAC52}" type="datetimeFigureOut">
               <a:rPr lang="en-US" smtClean="0"/>
-              <a:t>4/6/19</a:t>
+              <a:t>4/8/2019</a:t>
             </a:fld>
             <a:endParaRPr lang="en-US"/>
           </a:p>
@@ -3349,7 +3350,7 @@
           <a:p>
             <a:fld id="{1413064E-06D1-CA46-8C36-21FA595EAC52}" type="datetimeFigureOut">
               <a:rPr lang="en-US" smtClean="0"/>
-              <a:t>4/6/19</a:t>
+              <a:t>4/8/2019</a:t>
             </a:fld>
             <a:endParaRPr lang="en-US"/>
           </a:p>
@@ -3593,7 +3594,7 @@
           <a:p>
             <a:fld id="{1413064E-06D1-CA46-8C36-21FA595EAC52}" type="datetimeFigureOut">
               <a:rPr lang="en-US" smtClean="0"/>
-              <a:t>4/6/19</a:t>
+              <a:t>4/8/2019</a:t>
             </a:fld>
             <a:endParaRPr lang="en-US"/>
           </a:p>
@@ -3885,7 +3886,7 @@
           <a:p>
             <a:fld id="{1413064E-06D1-CA46-8C36-21FA595EAC52}" type="datetimeFigureOut">
               <a:rPr lang="en-US" smtClean="0"/>
-              <a:t>4/6/19</a:t>
+              <a:t>4/8/2019</a:t>
             </a:fld>
             <a:endParaRPr lang="en-US"/>
           </a:p>
@@ -4323,7 +4324,7 @@
           <a:p>
             <a:fld id="{1413064E-06D1-CA46-8C36-21FA595EAC52}" type="datetimeFigureOut">
               <a:rPr lang="en-US" smtClean="0"/>
-              <a:t>4/6/19</a:t>
+              <a:t>4/8/2019</a:t>
             </a:fld>
             <a:endParaRPr lang="en-US"/>
           </a:p>
@@ -4441,7 +4442,7 @@
           <a:p>
             <a:fld id="{1413064E-06D1-CA46-8C36-21FA595EAC52}" type="datetimeFigureOut">
               <a:rPr lang="en-US" smtClean="0"/>
-              <a:t>4/6/19</a:t>
+              <a:t>4/8/2019</a:t>
             </a:fld>
             <a:endParaRPr lang="en-US"/>
           </a:p>
@@ -4536,7 +4537,7 @@
           <a:p>
             <a:fld id="{1413064E-06D1-CA46-8C36-21FA595EAC52}" type="datetimeFigureOut">
               <a:rPr lang="en-US" smtClean="0"/>
-              <a:t>4/6/19</a:t>
+              <a:t>4/8/2019</a:t>
             </a:fld>
             <a:endParaRPr lang="en-US"/>
           </a:p>
@@ -4815,7 +4816,7 @@
           <a:p>
             <a:fld id="{1413064E-06D1-CA46-8C36-21FA595EAC52}" type="datetimeFigureOut">
               <a:rPr lang="en-US" smtClean="0"/>
-              <a:t>4/6/19</a:t>
+              <a:t>4/8/2019</a:t>
             </a:fld>
             <a:endParaRPr lang="en-US"/>
           </a:p>
@@ -5090,7 +5091,7 @@
           <a:p>
             <a:fld id="{1413064E-06D1-CA46-8C36-21FA595EAC52}" type="datetimeFigureOut">
               <a:rPr lang="en-US" smtClean="0"/>
-              <a:t>4/6/19</a:t>
+              <a:t>4/8/2019</a:t>
             </a:fld>
             <a:endParaRPr lang="en-US"/>
           </a:p>
@@ -5519,7 +5520,7 @@
           <a:p>
             <a:fld id="{1413064E-06D1-CA46-8C36-21FA595EAC52}" type="datetimeFigureOut">
               <a:rPr lang="en-US" smtClean="0"/>
-              <a:t>4/6/19</a:t>
+              <a:t>4/8/2019</a:t>
             </a:fld>
             <a:endParaRPr lang="en-US"/>
           </a:p>
@@ -6133,6 +6134,136 @@
 </p:sld>
 </file>
 
+<file path=ppt/slides/slide10.xml><?xml version="1.0" encoding="utf-8"?>
+<p:sld xmlns:a="http://schemas.openxmlformats.org/drawingml/2006/main" xmlns:r="http://schemas.openxmlformats.org/officeDocument/2006/relationships" xmlns:p="http://schemas.openxmlformats.org/presentationml/2006/main">
+  <p:cSld>
+    <p:spTree>
+      <p:nvGrpSpPr>
+        <p:cNvPr id="1" name=""/>
+        <p:cNvGrpSpPr/>
+        <p:nvPr/>
+      </p:nvGrpSpPr>
+      <p:grpSpPr>
+        <a:xfrm>
+          <a:off x="0" y="0"/>
+          <a:ext cx="0" cy="0"/>
+          <a:chOff x="0" y="0"/>
+          <a:chExt cx="0" cy="0"/>
+        </a:xfrm>
+      </p:grpSpPr>
+      <p:sp>
+        <p:nvSpPr>
+          <p:cNvPr id="2" name="Title 1">
+            <a:extLst>
+              <a:ext uri="{FF2B5EF4-FFF2-40B4-BE49-F238E27FC236}">
+                <a16:creationId xmlns:a16="http://schemas.microsoft.com/office/drawing/2014/main" id="{D443C54C-6DF9-CA4A-958E-308AAB870370}"/>
+              </a:ext>
+            </a:extLst>
+          </p:cNvPr>
+          <p:cNvSpPr>
+            <a:spLocks noGrp="1"/>
+          </p:cNvSpPr>
+          <p:nvPr>
+            <p:ph type="ctrTitle"/>
+          </p:nvPr>
+        </p:nvSpPr>
+        <p:spPr>
+          <a:xfrm>
+            <a:off x="1683171" y="1169773"/>
+            <a:ext cx="8825658" cy="2870161"/>
+          </a:xfrm>
+        </p:spPr>
+        <p:txBody>
+          <a:bodyPr anchor="b">
+            <a:normAutofit fontScale="90000"/>
+          </a:bodyPr>
+          <a:lstStyle/>
+          <a:p>
+            <a:pPr algn="ctr"/>
+            <a:r>
+              <a:rPr lang="en-US" dirty="0"/>
+              <a:t>Mass Spectrum Protein Matching with Neural Networks</a:t>
+            </a:r>
+          </a:p>
+        </p:txBody>
+      </p:sp>
+      <p:sp>
+        <p:nvSpPr>
+          <p:cNvPr id="3" name="Subtitle 2">
+            <a:extLst>
+              <a:ext uri="{FF2B5EF4-FFF2-40B4-BE49-F238E27FC236}">
+                <a16:creationId xmlns:a16="http://schemas.microsoft.com/office/drawing/2014/main" id="{CBB04ED8-73E4-FD41-843B-5F27AD032BF4}"/>
+              </a:ext>
+            </a:extLst>
+          </p:cNvPr>
+          <p:cNvSpPr>
+            <a:spLocks noGrp="1"/>
+          </p:cNvSpPr>
+          <p:nvPr>
+            <p:ph type="subTitle" idx="1"/>
+          </p:nvPr>
+        </p:nvSpPr>
+        <p:spPr>
+          <a:xfrm>
+            <a:off x="1683171" y="4293441"/>
+            <a:ext cx="8825658" cy="1234148"/>
+          </a:xfrm>
+        </p:spPr>
+        <p:txBody>
+          <a:bodyPr>
+            <a:normAutofit/>
+          </a:bodyPr>
+          <a:lstStyle/>
+          <a:p>
+            <a:pPr algn="ctr"/>
+            <a:r>
+              <a:rPr lang="en-US" sz="2000" cap="none" dirty="0">
+                <a:solidFill>
+                  <a:schemeClr val="tx1"/>
+                </a:solidFill>
+              </a:rPr>
+              <a:t>Matt Peter</a:t>
+            </a:r>
+          </a:p>
+          <a:p>
+            <a:pPr algn="ctr"/>
+            <a:r>
+              <a:rPr lang="en-US" sz="2000" cap="none" dirty="0">
+                <a:solidFill>
+                  <a:schemeClr val="tx1"/>
+                </a:solidFill>
+              </a:rPr>
+              <a:t>Jonah </a:t>
+            </a:r>
+            <a:r>
+              <a:rPr lang="en-US" sz="2000" cap="none" dirty="0" err="1">
+                <a:solidFill>
+                  <a:schemeClr val="tx1"/>
+                </a:solidFill>
+              </a:rPr>
+              <a:t>Kubath</a:t>
+            </a:r>
+            <a:endParaRPr lang="en-US" sz="2000" cap="none" dirty="0">
+              <a:solidFill>
+                <a:schemeClr val="tx1"/>
+              </a:solidFill>
+            </a:endParaRPr>
+          </a:p>
+        </p:txBody>
+      </p:sp>
+    </p:spTree>
+    <p:extLst>
+      <p:ext uri="{BB962C8B-B14F-4D97-AF65-F5344CB8AC3E}">
+        <p14:creationId xmlns:p14="http://schemas.microsoft.com/office/powerpoint/2010/main" val="481313425"/>
+      </p:ext>
+    </p:extLst>
+  </p:cSld>
+  <p:clrMapOvr>
+    <a:masterClrMapping/>
+  </p:clrMapOvr>
+</p:sld>
+</file>
+
 <file path=ppt/slides/slide2.xml><?xml version="1.0" encoding="utf-8"?>
 <p:sld xmlns:a="http://schemas.openxmlformats.org/drawingml/2006/main" xmlns:r="http://schemas.openxmlformats.org/officeDocument/2006/relationships" xmlns:p="http://schemas.openxmlformats.org/presentationml/2006/main">
   <p:cSld>
@@ -8020,7 +8151,7 @@
                   <a:schemeClr val="tx1"/>
                 </a:solidFill>
               </a:rPr>
-              <a:t>With MS2 test data, %30 accuracy for predicted protein label</a:t>
+              <a:t>With MS2 test data, %26 accuracy for predicted protein label</a:t>
             </a:r>
           </a:p>
           <a:p>
@@ -8145,6 +8276,255 @@
 </file>
 
 <file path=ppt/slides/slide8.xml><?xml version="1.0" encoding="utf-8"?>
+<p:sld xmlns:a="http://schemas.openxmlformats.org/drawingml/2006/main" xmlns:r="http://schemas.openxmlformats.org/officeDocument/2006/relationships" xmlns:p="http://schemas.openxmlformats.org/presentationml/2006/main">
+  <p:cSld>
+    <p:spTree>
+      <p:nvGrpSpPr>
+        <p:cNvPr id="1" name=""/>
+        <p:cNvGrpSpPr/>
+        <p:nvPr/>
+      </p:nvGrpSpPr>
+      <p:grpSpPr>
+        <a:xfrm>
+          <a:off x="0" y="0"/>
+          <a:ext cx="0" cy="0"/>
+          <a:chOff x="0" y="0"/>
+          <a:chExt cx="0" cy="0"/>
+        </a:xfrm>
+      </p:grpSpPr>
+      <p:sp>
+        <p:nvSpPr>
+          <p:cNvPr id="2" name="Title 1">
+            <a:extLst>
+              <a:ext uri="{FF2B5EF4-FFF2-40B4-BE49-F238E27FC236}">
+                <a16:creationId xmlns:a16="http://schemas.microsoft.com/office/drawing/2014/main" id="{17E01F6E-6773-4EE6-B85A-776D98EA9D29}"/>
+              </a:ext>
+            </a:extLst>
+          </p:cNvPr>
+          <p:cNvSpPr>
+            <a:spLocks noGrp="1"/>
+          </p:cNvSpPr>
+          <p:nvPr>
+            <p:ph type="title"/>
+          </p:nvPr>
+        </p:nvSpPr>
+        <p:spPr/>
+        <p:txBody>
+          <a:bodyPr/>
+          <a:lstStyle/>
+          <a:p>
+            <a:r>
+              <a:rPr lang="en-US" dirty="0"/>
+              <a:t>Results</a:t>
+            </a:r>
+          </a:p>
+        </p:txBody>
+      </p:sp>
+      <p:pic>
+        <p:nvPicPr>
+          <p:cNvPr id="5" name="Content Placeholder 4">
+            <a:extLst>
+              <a:ext uri="{FF2B5EF4-FFF2-40B4-BE49-F238E27FC236}">
+                <a16:creationId xmlns:a16="http://schemas.microsoft.com/office/drawing/2014/main" id="{818AB6D6-F1F6-43D2-8578-882EA7120E9B}"/>
+              </a:ext>
+            </a:extLst>
+          </p:cNvPr>
+          <p:cNvPicPr>
+            <a:picLocks noGrp="1" noChangeAspect="1"/>
+          </p:cNvPicPr>
+          <p:nvPr>
+            <p:ph idx="1"/>
+          </p:nvPr>
+        </p:nvPicPr>
+        <p:blipFill>
+          <a:blip r:embed="rId2"/>
+          <a:stretch>
+            <a:fillRect/>
+          </a:stretch>
+        </p:blipFill>
+        <p:spPr>
+          <a:xfrm>
+            <a:off x="595957" y="1859334"/>
+            <a:ext cx="4752515" cy="2380251"/>
+          </a:xfrm>
+        </p:spPr>
+      </p:pic>
+      <p:pic>
+        <p:nvPicPr>
+          <p:cNvPr id="7" name="Picture 6">
+            <a:extLst>
+              <a:ext uri="{FF2B5EF4-FFF2-40B4-BE49-F238E27FC236}">
+                <a16:creationId xmlns:a16="http://schemas.microsoft.com/office/drawing/2014/main" id="{AED54089-D5B1-43E5-B39E-6419C1B8FE91}"/>
+              </a:ext>
+            </a:extLst>
+          </p:cNvPr>
+          <p:cNvPicPr>
+            <a:picLocks noChangeAspect="1"/>
+          </p:cNvPicPr>
+          <p:nvPr/>
+        </p:nvPicPr>
+        <p:blipFill>
+          <a:blip r:embed="rId3"/>
+          <a:stretch>
+            <a:fillRect/>
+          </a:stretch>
+        </p:blipFill>
+        <p:spPr>
+          <a:xfrm>
+            <a:off x="1962564" y="5686190"/>
+            <a:ext cx="2019300" cy="200025"/>
+          </a:xfrm>
+          <a:prstGeom prst="rect">
+            <a:avLst/>
+          </a:prstGeom>
+        </p:spPr>
+      </p:pic>
+      <p:pic>
+        <p:nvPicPr>
+          <p:cNvPr id="9" name="Picture 8">
+            <a:extLst>
+              <a:ext uri="{FF2B5EF4-FFF2-40B4-BE49-F238E27FC236}">
+                <a16:creationId xmlns:a16="http://schemas.microsoft.com/office/drawing/2014/main" id="{BD5B7251-8219-43DF-B80A-ED1E15E5A1CD}"/>
+              </a:ext>
+            </a:extLst>
+          </p:cNvPr>
+          <p:cNvPicPr>
+            <a:picLocks noChangeAspect="1"/>
+          </p:cNvPicPr>
+          <p:nvPr/>
+        </p:nvPicPr>
+        <p:blipFill>
+          <a:blip r:embed="rId4"/>
+          <a:stretch>
+            <a:fillRect/>
+          </a:stretch>
+        </p:blipFill>
+        <p:spPr>
+          <a:xfrm>
+            <a:off x="6708711" y="1859334"/>
+            <a:ext cx="4752515" cy="2968322"/>
+          </a:xfrm>
+          <a:prstGeom prst="rect">
+            <a:avLst/>
+          </a:prstGeom>
+        </p:spPr>
+      </p:pic>
+      <p:pic>
+        <p:nvPicPr>
+          <p:cNvPr id="11" name="Picture 10">
+            <a:extLst>
+              <a:ext uri="{FF2B5EF4-FFF2-40B4-BE49-F238E27FC236}">
+                <a16:creationId xmlns:a16="http://schemas.microsoft.com/office/drawing/2014/main" id="{8B7E1709-3F59-46AC-99DF-847637D23717}"/>
+              </a:ext>
+            </a:extLst>
+          </p:cNvPr>
+          <p:cNvPicPr>
+            <a:picLocks noChangeAspect="1"/>
+          </p:cNvPicPr>
+          <p:nvPr/>
+        </p:nvPicPr>
+        <p:blipFill>
+          <a:blip r:embed="rId5"/>
+          <a:stretch>
+            <a:fillRect/>
+          </a:stretch>
+        </p:blipFill>
+        <p:spPr>
+          <a:xfrm>
+            <a:off x="8070555" y="5686190"/>
+            <a:ext cx="2028825" cy="200025"/>
+          </a:xfrm>
+          <a:prstGeom prst="rect">
+            <a:avLst/>
+          </a:prstGeom>
+        </p:spPr>
+      </p:pic>
+      <p:sp>
+        <p:nvSpPr>
+          <p:cNvPr id="12" name="TextBox 11">
+            <a:extLst>
+              <a:ext uri="{FF2B5EF4-FFF2-40B4-BE49-F238E27FC236}">
+                <a16:creationId xmlns:a16="http://schemas.microsoft.com/office/drawing/2014/main" id="{B705CFFB-F784-462D-A342-10A7E3A7D9F9}"/>
+              </a:ext>
+            </a:extLst>
+          </p:cNvPr>
+          <p:cNvSpPr txBox="1"/>
+          <p:nvPr/>
+        </p:nvSpPr>
+        <p:spPr>
+          <a:xfrm>
+            <a:off x="1771922" y="1427540"/>
+            <a:ext cx="2405849" cy="369332"/>
+          </a:xfrm>
+          <a:prstGeom prst="rect">
+            <a:avLst/>
+          </a:prstGeom>
+          <a:noFill/>
+        </p:spPr>
+        <p:txBody>
+          <a:bodyPr wrap="square" rtlCol="0">
+            <a:spAutoFit/>
+          </a:bodyPr>
+          <a:lstStyle/>
+          <a:p>
+            <a:pPr algn="ctr"/>
+            <a:r>
+              <a:rPr lang="en-US" dirty="0"/>
+              <a:t>Dense Network</a:t>
+            </a:r>
+          </a:p>
+        </p:txBody>
+      </p:sp>
+      <p:sp>
+        <p:nvSpPr>
+          <p:cNvPr id="13" name="TextBox 12">
+            <a:extLst>
+              <a:ext uri="{FF2B5EF4-FFF2-40B4-BE49-F238E27FC236}">
+                <a16:creationId xmlns:a16="http://schemas.microsoft.com/office/drawing/2014/main" id="{85A9C9F9-81AE-4F48-A5A4-F71F3A792406}"/>
+              </a:ext>
+            </a:extLst>
+          </p:cNvPr>
+          <p:cNvSpPr txBox="1"/>
+          <p:nvPr/>
+        </p:nvSpPr>
+        <p:spPr>
+          <a:xfrm>
+            <a:off x="7488839" y="1427540"/>
+            <a:ext cx="3192255" cy="369332"/>
+          </a:xfrm>
+          <a:prstGeom prst="rect">
+            <a:avLst/>
+          </a:prstGeom>
+          <a:noFill/>
+        </p:spPr>
+        <p:txBody>
+          <a:bodyPr wrap="square" rtlCol="0">
+            <a:spAutoFit/>
+          </a:bodyPr>
+          <a:lstStyle/>
+          <a:p>
+            <a:pPr algn="ctr"/>
+            <a:r>
+              <a:rPr lang="en-US" dirty="0"/>
+              <a:t>Convolutional Network</a:t>
+            </a:r>
+          </a:p>
+        </p:txBody>
+      </p:sp>
+    </p:spTree>
+    <p:extLst>
+      <p:ext uri="{BB962C8B-B14F-4D97-AF65-F5344CB8AC3E}">
+        <p14:creationId xmlns:p14="http://schemas.microsoft.com/office/powerpoint/2010/main" val="72608370"/>
+      </p:ext>
+    </p:extLst>
+  </p:cSld>
+  <p:clrMapOvr>
+    <a:masterClrMapping/>
+  </p:clrMapOvr>
+</p:sld>
+</file>
+
+<file path=ppt/slides/slide9.xml><?xml version="1.0" encoding="utf-8"?>
 <p:sld xmlns:a="http://schemas.openxmlformats.org/drawingml/2006/main" xmlns:r="http://schemas.openxmlformats.org/officeDocument/2006/relationships" xmlns:p="http://schemas.openxmlformats.org/presentationml/2006/main">
   <p:cSld>
     <p:bg>
@@ -8432,136 +8812,6 @@
     <p:extLst>
       <p:ext uri="{BB962C8B-B14F-4D97-AF65-F5344CB8AC3E}">
         <p14:creationId xmlns:p14="http://schemas.microsoft.com/office/powerpoint/2010/main" val="586712507"/>
-      </p:ext>
-    </p:extLst>
-  </p:cSld>
-  <p:clrMapOvr>
-    <a:masterClrMapping/>
-  </p:clrMapOvr>
-</p:sld>
-</file>
-
-<file path=ppt/slides/slide9.xml><?xml version="1.0" encoding="utf-8"?>
-<p:sld xmlns:a="http://schemas.openxmlformats.org/drawingml/2006/main" xmlns:r="http://schemas.openxmlformats.org/officeDocument/2006/relationships" xmlns:p="http://schemas.openxmlformats.org/presentationml/2006/main">
-  <p:cSld>
-    <p:spTree>
-      <p:nvGrpSpPr>
-        <p:cNvPr id="1" name=""/>
-        <p:cNvGrpSpPr/>
-        <p:nvPr/>
-      </p:nvGrpSpPr>
-      <p:grpSpPr>
-        <a:xfrm>
-          <a:off x="0" y="0"/>
-          <a:ext cx="0" cy="0"/>
-          <a:chOff x="0" y="0"/>
-          <a:chExt cx="0" cy="0"/>
-        </a:xfrm>
-      </p:grpSpPr>
-      <p:sp>
-        <p:nvSpPr>
-          <p:cNvPr id="2" name="Title 1">
-            <a:extLst>
-              <a:ext uri="{FF2B5EF4-FFF2-40B4-BE49-F238E27FC236}">
-                <a16:creationId xmlns:a16="http://schemas.microsoft.com/office/drawing/2014/main" id="{D443C54C-6DF9-CA4A-958E-308AAB870370}"/>
-              </a:ext>
-            </a:extLst>
-          </p:cNvPr>
-          <p:cNvSpPr>
-            <a:spLocks noGrp="1"/>
-          </p:cNvSpPr>
-          <p:nvPr>
-            <p:ph type="ctrTitle"/>
-          </p:nvPr>
-        </p:nvSpPr>
-        <p:spPr>
-          <a:xfrm>
-            <a:off x="1683171" y="1169773"/>
-            <a:ext cx="8825658" cy="2870161"/>
-          </a:xfrm>
-        </p:spPr>
-        <p:txBody>
-          <a:bodyPr anchor="b">
-            <a:normAutofit fontScale="90000"/>
-          </a:bodyPr>
-          <a:lstStyle/>
-          <a:p>
-            <a:pPr algn="ctr"/>
-            <a:r>
-              <a:rPr lang="en-US" dirty="0"/>
-              <a:t>Mass Spectrum Protein Matching with Neural Networks</a:t>
-            </a:r>
-          </a:p>
-        </p:txBody>
-      </p:sp>
-      <p:sp>
-        <p:nvSpPr>
-          <p:cNvPr id="3" name="Subtitle 2">
-            <a:extLst>
-              <a:ext uri="{FF2B5EF4-FFF2-40B4-BE49-F238E27FC236}">
-                <a16:creationId xmlns:a16="http://schemas.microsoft.com/office/drawing/2014/main" id="{CBB04ED8-73E4-FD41-843B-5F27AD032BF4}"/>
-              </a:ext>
-            </a:extLst>
-          </p:cNvPr>
-          <p:cNvSpPr>
-            <a:spLocks noGrp="1"/>
-          </p:cNvSpPr>
-          <p:nvPr>
-            <p:ph type="subTitle" idx="1"/>
-          </p:nvPr>
-        </p:nvSpPr>
-        <p:spPr>
-          <a:xfrm>
-            <a:off x="1683171" y="4293441"/>
-            <a:ext cx="8825658" cy="1234148"/>
-          </a:xfrm>
-        </p:spPr>
-        <p:txBody>
-          <a:bodyPr>
-            <a:normAutofit/>
-          </a:bodyPr>
-          <a:lstStyle/>
-          <a:p>
-            <a:pPr algn="ctr"/>
-            <a:r>
-              <a:rPr lang="en-US" sz="2000" cap="none" dirty="0">
-                <a:solidFill>
-                  <a:schemeClr val="tx1"/>
-                </a:solidFill>
-              </a:rPr>
-              <a:t>Matt Peter</a:t>
-            </a:r>
-          </a:p>
-          <a:p>
-            <a:pPr algn="ctr"/>
-            <a:r>
-              <a:rPr lang="en-US" sz="2000" cap="none" dirty="0">
-                <a:solidFill>
-                  <a:schemeClr val="tx1"/>
-                </a:solidFill>
-              </a:rPr>
-              <a:t>Jonah </a:t>
-            </a:r>
-            <a:r>
-              <a:rPr lang="en-US" sz="2000" cap="none" dirty="0" err="1">
-                <a:solidFill>
-                  <a:schemeClr val="tx1"/>
-                </a:solidFill>
-              </a:rPr>
-              <a:t>Kubath</a:t>
-            </a:r>
-            <a:endParaRPr lang="en-US" sz="2000" cap="none" dirty="0">
-              <a:solidFill>
-                <a:schemeClr val="tx1"/>
-              </a:solidFill>
-            </a:endParaRPr>
-          </a:p>
-        </p:txBody>
-      </p:sp>
-    </p:spTree>
-    <p:extLst>
-      <p:ext uri="{BB962C8B-B14F-4D97-AF65-F5344CB8AC3E}">
-        <p14:creationId xmlns:p14="http://schemas.microsoft.com/office/powerpoint/2010/main" val="481313425"/>
       </p:ext>
     </p:extLst>
   </p:cSld>

</xml_diff>